<commit_message>
ultimas alterações do ppt
</commit_message>
<xml_diff>
--- a/Documentos/sprint1.pptx
+++ b/Documentos/sprint1.pptx
@@ -5,7 +5,7 @@
     <p:sldMasterId id="2147483659" r:id="rId1"/>
   </p:sldMasterIdLst>
   <p:notesMasterIdLst>
-    <p:notesMasterId r:id="rId23"/>
+    <p:notesMasterId r:id="rId24"/>
   </p:notesMasterIdLst>
   <p:sldIdLst>
     <p:sldId id="256" r:id="rId2"/>
@@ -29,32 +29,33 @@
     <p:sldId id="288" r:id="rId20"/>
     <p:sldId id="286" r:id="rId21"/>
     <p:sldId id="296" r:id="rId22"/>
+    <p:sldId id="304" r:id="rId23"/>
   </p:sldIdLst>
   <p:sldSz cx="9144000" cy="5143500" type="screen16x9"/>
   <p:notesSz cx="6858000" cy="9144000"/>
   <p:embeddedFontLst>
     <p:embeddedFont>
       <p:font typeface="Calibri" panose="020F0502020204030204" pitchFamily="34" charset="0"/>
-      <p:regular r:id="rId24"/>
-      <p:bold r:id="rId25"/>
-      <p:italic r:id="rId26"/>
-      <p:boldItalic r:id="rId27"/>
+      <p:regular r:id="rId25"/>
+      <p:bold r:id="rId26"/>
+      <p:italic r:id="rId27"/>
+      <p:boldItalic r:id="rId28"/>
     </p:embeddedFont>
     <p:embeddedFont>
       <p:font typeface="MV Boli" panose="02000500030200090000" pitchFamily="2" charset="0"/>
-      <p:regular r:id="rId28"/>
+      <p:regular r:id="rId29"/>
     </p:embeddedFont>
     <p:embeddedFont>
       <p:font typeface="Oswald" panose="020B0604020202020204" charset="0"/>
-      <p:regular r:id="rId29"/>
-      <p:bold r:id="rId30"/>
+      <p:regular r:id="rId30"/>
+      <p:bold r:id="rId31"/>
     </p:embeddedFont>
     <p:embeddedFont>
       <p:font typeface="Source Sans Pro" panose="020B0503030403020204" pitchFamily="34" charset="0"/>
-      <p:regular r:id="rId31"/>
-      <p:bold r:id="rId32"/>
-      <p:italic r:id="rId33"/>
-      <p:boldItalic r:id="rId34"/>
+      <p:regular r:id="rId32"/>
+      <p:bold r:id="rId33"/>
+      <p:italic r:id="rId34"/>
+      <p:boldItalic r:id="rId35"/>
     </p:embeddedFont>
   </p:embeddedFontLst>
   <p:defaultTextStyle>
@@ -286,6 +287,11 @@
       </a:defRPr>
     </a:lvl9pPr>
   </p:defaultTextStyle>
+  <p:extLst>
+    <p:ext uri="{EFAFB233-063F-42B5-8137-9DF3F51BA10A}">
+      <p15:sldGuideLst xmlns:p15="http://schemas.microsoft.com/office/powerpoint/2012/main"/>
+    </p:ext>
+  </p:extLst>
 </p:presentation>
 </file>
 
@@ -20324,6 +20330,74 @@
 </p:sld>
 </file>
 
+<file path=ppt/slides/slide22.xml><?xml version="1.0" encoding="utf-8"?>
+<p:sld xmlns:a="http://schemas.openxmlformats.org/drawingml/2006/main" xmlns:r="http://schemas.openxmlformats.org/officeDocument/2006/relationships" xmlns:p="http://schemas.openxmlformats.org/presentationml/2006/main">
+  <p:cSld>
+    <p:spTree>
+      <p:nvGrpSpPr>
+        <p:cNvPr id="1" name=""/>
+        <p:cNvGrpSpPr/>
+        <p:nvPr/>
+      </p:nvGrpSpPr>
+      <p:grpSpPr>
+        <a:xfrm>
+          <a:off x="0" y="0"/>
+          <a:ext cx="0" cy="0"/>
+          <a:chOff x="0" y="0"/>
+          <a:chExt cx="0" cy="0"/>
+        </a:xfrm>
+      </p:grpSpPr>
+      <p:sp>
+        <p:nvSpPr>
+          <p:cNvPr id="2" name="Espaço Reservado para Número de Slide 1">
+            <a:extLst>
+              <a:ext uri="{FF2B5EF4-FFF2-40B4-BE49-F238E27FC236}">
+                <a16:creationId xmlns:a16="http://schemas.microsoft.com/office/drawing/2014/main" id="{FCC3EAC3-EE6A-4C77-AE28-09ECA242DB08}"/>
+              </a:ext>
+            </a:extLst>
+          </p:cNvPr>
+          <p:cNvSpPr>
+            <a:spLocks noGrp="1"/>
+          </p:cNvSpPr>
+          <p:nvPr>
+            <p:ph type="sldNum" idx="12"/>
+          </p:nvPr>
+        </p:nvSpPr>
+        <p:spPr/>
+        <p:txBody>
+          <a:bodyPr/>
+          <a:lstStyle/>
+          <a:p>
+            <a:pPr marL="0" lvl="0" indent="0" algn="r" rtl="0">
+              <a:spcBef>
+                <a:spcPts val="0"/>
+              </a:spcBef>
+              <a:spcAft>
+                <a:spcPts val="0"/>
+              </a:spcAft>
+              <a:buNone/>
+            </a:pPr>
+            <a:fld id="{00000000-1234-1234-1234-123412341234}" type="slidenum">
+              <a:rPr lang="pt-BR" smtClean="0"/>
+              <a:t>22</a:t>
+            </a:fld>
+            <a:endParaRPr lang="pt-BR"/>
+          </a:p>
+        </p:txBody>
+      </p:sp>
+    </p:spTree>
+    <p:extLst>
+      <p:ext uri="{BB962C8B-B14F-4D97-AF65-F5344CB8AC3E}">
+        <p14:creationId xmlns:p14="http://schemas.microsoft.com/office/powerpoint/2010/main" val="4104082913"/>
+      </p:ext>
+    </p:extLst>
+  </p:cSld>
+  <p:clrMapOvr>
+    <a:masterClrMapping/>
+  </p:clrMapOvr>
+</p:sld>
+</file>
+
 <file path=ppt/slides/slide3.xml><?xml version="1.0" encoding="utf-8"?>
 <p:sld xmlns:a="http://schemas.openxmlformats.org/drawingml/2006/main" xmlns:r="http://schemas.openxmlformats.org/officeDocument/2006/relationships" xmlns:p="http://schemas.openxmlformats.org/presentationml/2006/main">
   <p:cSld>

</xml_diff>